<commit_message>
add main body screenshots with descriptions. add features section
</commit_message>
<xml_diff>
--- a/EducationForAll.pptx
+++ b/EducationForAll.pptx
@@ -243,7 +243,7 @@
             <a:fld id="{9CF59EBC-EC05-6B4D-B166-DDFA6A1EDCB6}" type="datetimeFigureOut">
               <a:rPr lang="en-US" smtClean="0"/>
               <a:pPr/>
-              <a:t>12/1/2018</a:t>
+              <a:t>12/2/2018</a:t>
             </a:fld>
             <a:endParaRPr lang="en-US" dirty="0"/>
           </a:p>
@@ -307,38 +307,37 @@
           <a:p>
             <a:pPr lvl="0"/>
             <a:r>
-              <a:rPr lang="en-US" dirty="0" smtClean="0"/>
+              <a:rPr lang="en-US" dirty="0"/>
               <a:t>Click to edit Master text styles</a:t>
             </a:r>
           </a:p>
           <a:p>
             <a:pPr lvl="1"/>
             <a:r>
-              <a:rPr lang="en-US" dirty="0" smtClean="0"/>
+              <a:rPr lang="en-US" dirty="0"/>
               <a:t>Second level</a:t>
             </a:r>
           </a:p>
           <a:p>
             <a:pPr lvl="2"/>
             <a:r>
-              <a:rPr lang="en-US" dirty="0" smtClean="0"/>
+              <a:rPr lang="en-US" dirty="0"/>
               <a:t>Third level</a:t>
             </a:r>
           </a:p>
           <a:p>
             <a:pPr lvl="3"/>
             <a:r>
-              <a:rPr lang="en-US" dirty="0" smtClean="0"/>
+              <a:rPr lang="en-US" dirty="0"/>
               <a:t>Fourth level</a:t>
             </a:r>
           </a:p>
           <a:p>
             <a:pPr lvl="4"/>
             <a:r>
-              <a:rPr lang="en-US" dirty="0" smtClean="0"/>
+              <a:rPr lang="en-US" dirty="0"/>
               <a:t>Fifth level</a:t>
             </a:r>
-            <a:endParaRPr lang="en-US" dirty="0"/>
           </a:p>
         </p:txBody>
       </p:sp>
@@ -819,18 +818,13 @@
           </a:lstStyle>
           <a:p>
             <a:r>
-              <a:rPr lang="en-US" sz="5400" cap="none" spc="520" baseline="0" dirty="0" smtClean="0">
+              <a:rPr lang="en-US" sz="5400" cap="none" spc="520" baseline="0" dirty="0">
                 <a:latin typeface="Impact" charset="0"/>
                 <a:ea typeface="Impact" charset="0"/>
                 <a:cs typeface="Impact" charset="0"/>
               </a:rPr>
               <a:t>Electrical Engineering and Computer Science</a:t>
             </a:r>
-            <a:endParaRPr lang="en-US" sz="5400" cap="none" spc="520" baseline="0" dirty="0">
-              <a:latin typeface="Impact" charset="0"/>
-              <a:ea typeface="Impact" charset="0"/>
-              <a:cs typeface="Impact" charset="0"/>
-            </a:endParaRPr>
           </a:p>
         </p:txBody>
       </p:sp>
@@ -991,7 +985,7 @@
           <a:p>
             <a:pPr algn="ctr"/>
             <a:r>
-              <a:rPr lang="en-US" sz="5400" b="0" i="0" cap="none" spc="170" dirty="0" smtClean="0">
+              <a:rPr lang="en-US" sz="5400" b="0" i="0" cap="none" spc="170" dirty="0">
                 <a:solidFill>
                   <a:schemeClr val="tx1"/>
                 </a:solidFill>
@@ -1000,13 +994,6 @@
               </a:rPr>
               <a:t>FOLD</a:t>
             </a:r>
-            <a:endParaRPr lang="en-US" sz="5400" b="0" i="0" cap="none" spc="170" dirty="0">
-              <a:solidFill>
-                <a:schemeClr val="tx1"/>
-              </a:solidFill>
-              <a:latin typeface="Verdana Regular" charset="0"/>
-              <a:cs typeface="Verdana Regular" charset="0"/>
-            </a:endParaRPr>
           </a:p>
         </p:txBody>
       </p:sp>
@@ -1089,7 +1076,7 @@
           <a:p>
             <a:pPr algn="ctr"/>
             <a:r>
-              <a:rPr lang="en-US" sz="5400" b="0" i="0" cap="none" spc="170" dirty="0" smtClean="0">
+              <a:rPr lang="en-US" sz="5400" b="0" i="0" cap="none" spc="170" dirty="0">
                 <a:solidFill>
                   <a:schemeClr val="tx1"/>
                 </a:solidFill>
@@ -1098,13 +1085,6 @@
               </a:rPr>
               <a:t>FOLD</a:t>
             </a:r>
-            <a:endParaRPr lang="en-US" sz="5400" b="0" i="0" cap="none" spc="170" dirty="0">
-              <a:solidFill>
-                <a:schemeClr val="tx1"/>
-              </a:solidFill>
-              <a:latin typeface="Verdana Regular" charset="0"/>
-              <a:cs typeface="Verdana Regular" charset="0"/>
-            </a:endParaRPr>
           </a:p>
         </p:txBody>
       </p:sp>
@@ -1187,7 +1167,7 @@
           <a:p>
             <a:pPr algn="ctr"/>
             <a:r>
-              <a:rPr lang="en-US" sz="5400" b="0" i="0" cap="none" spc="170" dirty="0" smtClean="0">
+              <a:rPr lang="en-US" sz="5400" b="0" i="0" cap="none" spc="170" dirty="0">
                 <a:solidFill>
                   <a:schemeClr val="tx1"/>
                 </a:solidFill>
@@ -1196,13 +1176,6 @@
               </a:rPr>
               <a:t>FOLD</a:t>
             </a:r>
-            <a:endParaRPr lang="en-US" sz="5400" b="0" i="0" cap="none" spc="170" dirty="0">
-              <a:solidFill>
-                <a:schemeClr val="tx1"/>
-              </a:solidFill>
-              <a:latin typeface="Verdana Regular" charset="0"/>
-              <a:cs typeface="Verdana Regular" charset="0"/>
-            </a:endParaRPr>
           </a:p>
         </p:txBody>
       </p:sp>
@@ -1285,7 +1258,7 @@
           <a:p>
             <a:pPr algn="ctr"/>
             <a:r>
-              <a:rPr lang="en-US" sz="5400" b="0" i="0" cap="none" spc="170" dirty="0" smtClean="0">
+              <a:rPr lang="en-US" sz="5400" b="0" i="0" cap="none" spc="170" dirty="0">
                 <a:solidFill>
                   <a:schemeClr val="tx1"/>
                 </a:solidFill>
@@ -1294,13 +1267,6 @@
               </a:rPr>
               <a:t>FOLD</a:t>
             </a:r>
-            <a:endParaRPr lang="en-US" sz="5400" b="0" i="0" cap="none" spc="170" dirty="0">
-              <a:solidFill>
-                <a:schemeClr val="tx1"/>
-              </a:solidFill>
-              <a:latin typeface="Verdana Regular" charset="0"/>
-              <a:cs typeface="Verdana Regular" charset="0"/>
-            </a:endParaRPr>
           </a:p>
         </p:txBody>
       </p:sp>
@@ -1387,7 +1353,7 @@
               </a:lnSpc>
             </a:pPr>
             <a:r>
-              <a:rPr lang="en-US" sz="5400" b="0" i="0" cap="none" spc="170" dirty="0" smtClean="0">
+              <a:rPr lang="en-US" sz="5400" b="0" i="0" cap="none" spc="170" dirty="0">
                 <a:solidFill>
                   <a:schemeClr val="tx1"/>
                 </a:solidFill>
@@ -1397,7 +1363,7 @@
               <a:t>NO</a:t>
             </a:r>
             <a:r>
-              <a:rPr lang="en-US" sz="5400" b="0" i="0" cap="none" spc="170" baseline="0" dirty="0" smtClean="0">
+              <a:rPr lang="en-US" sz="5400" b="0" i="0" cap="none" spc="170" baseline="0" dirty="0">
                 <a:solidFill>
                   <a:schemeClr val="tx1"/>
                 </a:solidFill>
@@ -1414,7 +1380,7 @@
               </a:lnSpc>
             </a:pPr>
             <a:r>
-              <a:rPr lang="en-US" sz="5400" b="0" i="0" cap="none" spc="170" baseline="0" dirty="0" smtClean="0">
+              <a:rPr lang="en-US" sz="5400" b="0" i="0" cap="none" spc="170" baseline="0" dirty="0">
                 <a:solidFill>
                   <a:schemeClr val="tx1"/>
                 </a:solidFill>
@@ -1531,18 +1497,13 @@
               </a:spcBef>
             </a:pPr>
             <a:r>
-              <a:rPr lang="en-US" sz="5400" spc="520" baseline="0" dirty="0" smtClean="0">
+              <a:rPr lang="en-US" sz="5400" spc="520" baseline="0" dirty="0">
                 <a:latin typeface="Impact" charset="0"/>
                 <a:ea typeface="Impact" charset="0"/>
                 <a:cs typeface="Impact" charset="0"/>
               </a:rPr>
               <a:t>COLLEGE OF ENGINEERING</a:t>
             </a:r>
-            <a:endParaRPr lang="en-US" sz="5400" spc="520" baseline="0" dirty="0">
-              <a:latin typeface="Impact" charset="0"/>
-              <a:ea typeface="Impact" charset="0"/>
-              <a:cs typeface="Impact" charset="0"/>
-            </a:endParaRPr>
           </a:p>
         </p:txBody>
       </p:sp>
@@ -2044,7 +2005,7 @@
           </a:lstStyle>
           <a:p>
             <a:r>
-              <a:rPr lang="en-US" dirty="0" smtClean="0">
+              <a:rPr lang="en-US" dirty="0">
                 <a:solidFill>
                   <a:srgbClr val="E05529"/>
                 </a:solidFill>
@@ -2052,12 +2013,6 @@
               </a:rPr>
               <a:t>Design and planning</a:t>
             </a:r>
-            <a:endParaRPr lang="en-US" dirty="0">
-              <a:solidFill>
-                <a:srgbClr val="E05529"/>
-              </a:solidFill>
-              <a:latin typeface="Verdana Regular" charset="0"/>
-            </a:endParaRPr>
           </a:p>
         </p:txBody>
       </p:sp>
@@ -2259,16 +2214,10 @@
               <a:buChar char="•"/>
             </a:pPr>
             <a:r>
-              <a:rPr lang="en-US" dirty="0" smtClean="0">
+              <a:rPr lang="en-US" dirty="0">
                 <a:latin typeface="Verdana Regular" charset="0"/>
               </a:rPr>
-              <a:t>Our team of </a:t>
-            </a:r>
-            <a:r>
-              <a:rPr lang="en-US" dirty="0" smtClean="0">
-                <a:latin typeface="Verdana Regular" charset="0"/>
-              </a:rPr>
-              <a:t>five took on our customer – Jacob Carter’s vision and worked collaboratively on the design and planning of the Education For All web application. </a:t>
+              <a:t>Our team of five took on our customer – Jacob Carter’s vision and worked collaboratively on the design and planning of the Education For All web application. </a:t>
             </a:r>
           </a:p>
           <a:p>
@@ -2280,7 +2229,7 @@
               <a:buChar char="•"/>
             </a:pPr>
             <a:r>
-              <a:rPr lang="en-US" dirty="0" smtClean="0">
+              <a:rPr lang="en-US" dirty="0">
                 <a:latin typeface="Verdana Regular" charset="0"/>
               </a:rPr>
               <a:t>We chose the client-server architecture for our program. We mapped out the entity relationship diagram for database. As part of the process, we also did the interface requirements as well as data flow.</a:t>
@@ -2295,7 +2244,7 @@
               <a:buChar char="•"/>
             </a:pPr>
             <a:r>
-              <a:rPr lang="en-US" dirty="0" smtClean="0">
+              <a:rPr lang="en-US" dirty="0">
                 <a:latin typeface="Verdana Regular" charset="0"/>
               </a:rPr>
               <a:t>We then came up with user stories to break down the program into smaller portions to implement. </a:t>
@@ -2310,14 +2259,11 @@
               <a:buChar char="•"/>
             </a:pPr>
             <a:r>
-              <a:rPr lang="en-US" dirty="0" smtClean="0">
+              <a:rPr lang="en-US" dirty="0">
                 <a:latin typeface="Verdana Regular" charset="0"/>
               </a:rPr>
               <a:t>This application was developed by agile processes. </a:t>
             </a:r>
-            <a:endParaRPr lang="en-US" dirty="0">
-              <a:latin typeface="Verdana Regular" charset="0"/>
-            </a:endParaRPr>
           </a:p>
         </p:txBody>
       </p:sp>
@@ -2508,7 +2454,7 @@
           </a:lstStyle>
           <a:p>
             <a:r>
-              <a:rPr lang="en-US" dirty="0" smtClean="0">
+              <a:rPr lang="en-US" dirty="0">
                 <a:solidFill>
                   <a:srgbClr val="E05529"/>
                 </a:solidFill>
@@ -2516,12 +2462,6 @@
               </a:rPr>
               <a:t>Implementation and Testing</a:t>
             </a:r>
-            <a:endParaRPr lang="en-US" dirty="0">
-              <a:solidFill>
-                <a:srgbClr val="E05529"/>
-              </a:solidFill>
-              <a:latin typeface="Verdana Regular" charset="0"/>
-            </a:endParaRPr>
           </a:p>
         </p:txBody>
       </p:sp>
@@ -2721,7 +2661,7 @@
               </a:spcAft>
             </a:pPr>
             <a:r>
-              <a:rPr lang="en-US" dirty="0" smtClean="0">
+              <a:rPr lang="en-US" dirty="0">
                 <a:latin typeface="Verdana Regular" charset="0"/>
               </a:rPr>
               <a:t>We prioritized our top user stories to implement while maintain communication with our customer and team members. </a:t>
@@ -2734,14 +2674,11 @@
               </a:spcAft>
             </a:pPr>
             <a:r>
-              <a:rPr lang="en-US" dirty="0" smtClean="0">
+              <a:rPr lang="en-US" dirty="0">
                 <a:latin typeface="Verdana Regular" charset="0"/>
               </a:rPr>
               <a:t>After implementation, we did unit testing, integration testing and acceptance testing to meet quality targets.</a:t>
             </a:r>
-            <a:endParaRPr lang="en-US" dirty="0" smtClean="0">
-              <a:latin typeface="Verdana Regular" charset="0"/>
-            </a:endParaRPr>
           </a:p>
           <a:p>
             <a:pPr>
@@ -2750,16 +2687,10 @@
               </a:spcAft>
             </a:pPr>
             <a:r>
-              <a:rPr lang="en-US" dirty="0" smtClean="0">
+              <a:rPr lang="en-US" dirty="0">
                 <a:latin typeface="Verdana Regular" charset="0"/>
               </a:rPr>
-              <a:t>Rapid feedback cycle allows us to identify problems/issues </a:t>
-            </a:r>
-            <a:r>
-              <a:rPr lang="en-US" dirty="0" smtClean="0">
-                <a:latin typeface="Verdana Regular" charset="0"/>
-              </a:rPr>
-              <a:t>and resolve them quickly.</a:t>
+              <a:t>Rapid feedback cycle allows us to identify problems/issues and resolve them quickly.</a:t>
             </a:r>
           </a:p>
           <a:p>
@@ -2769,20 +2700,11 @@
               </a:spcAft>
             </a:pPr>
             <a:r>
-              <a:rPr lang="en-US" dirty="0" smtClean="0">
+              <a:rPr lang="en-US" dirty="0">
                 <a:latin typeface="Verdana Regular" charset="0"/>
               </a:rPr>
-              <a:t>??? Anything else?</a:t>
-            </a:r>
-            <a:r>
-              <a:rPr lang="en-US" dirty="0" smtClean="0">
-                <a:latin typeface="Verdana Regular" charset="0"/>
-              </a:rPr>
-              <a:t>  </a:t>
-            </a:r>
-            <a:endParaRPr lang="en-US" dirty="0">
-              <a:latin typeface="Verdana Regular" charset="0"/>
-            </a:endParaRPr>
+              <a:t>??? Anything else?  </a:t>
+            </a:r>
           </a:p>
           <a:p>
             <a:pPr marL="0" indent="0">
@@ -2984,7 +2906,7 @@
           </a:lstStyle>
           <a:p>
             <a:r>
-              <a:rPr lang="en-US" dirty="0" smtClean="0">
+              <a:rPr lang="en-US" dirty="0">
                 <a:solidFill>
                   <a:srgbClr val="FFFFFF"/>
                 </a:solidFill>
@@ -2992,12 +2914,6 @@
               </a:rPr>
               <a:t>Background</a:t>
             </a:r>
-            <a:endParaRPr lang="en-US" dirty="0">
-              <a:solidFill>
-                <a:srgbClr val="FFFFFF"/>
-              </a:solidFill>
-              <a:latin typeface="Verdana Regular" charset="0"/>
-            </a:endParaRPr>
           </a:p>
         </p:txBody>
       </p:sp>
@@ -3208,27 +3124,8 @@
                 <a:ea typeface="Verdana" charset="0"/>
                 <a:cs typeface="Verdana" charset="0"/>
               </a:rPr>
-              <a:t>Millions of individuals are incarcerated in the United States and the number continues to trend upwards. Much of this is due to the lack of any rehabilitative programs, especially in the realm of education, which has resulted in a “warehousing crisis”. Quite often incarcerated individuals have a desire to enroll in educational programs, but are unable to do </a:t>
-            </a:r>
-            <a:r>
-              <a:rPr lang="en-US" dirty="0" smtClean="0">
-                <a:solidFill>
-                  <a:schemeClr val="bg1"/>
-                </a:solidFill>
-                <a:latin typeface="Verdana" charset="0"/>
-                <a:ea typeface="Verdana" charset="0"/>
-                <a:cs typeface="Verdana" charset="0"/>
-              </a:rPr>
-              <a:t>so.</a:t>
-            </a:r>
-            <a:endParaRPr lang="en-US" dirty="0">
-              <a:solidFill>
-                <a:schemeClr val="bg1"/>
-              </a:solidFill>
-              <a:latin typeface="Verdana" charset="0"/>
-              <a:ea typeface="Verdana" charset="0"/>
-              <a:cs typeface="Verdana" charset="0"/>
-            </a:endParaRPr>
+              <a:t>Millions of individuals are incarcerated in the United States and the number continues to trend upwards. Much of this is due to the lack of any rehabilitative programs, especially in the realm of education, which has resulted in a “warehousing crisis”. Quite often incarcerated individuals have a desire to enroll in educational programs, but are unable to do so.</a:t>
+            </a:r>
           </a:p>
           <a:p>
             <a:pPr>
@@ -3299,18 +3196,7 @@
                 <a:ea typeface="Verdana" charset="0"/>
                 <a:cs typeface="Verdana" charset="0"/>
               </a:rPr>
-              <a:t>In 2017 the Department of Education proposed the National Education Technology Plan which states that “Moving forward, increasingly sophisticated technology-driven assessments will enable more powerful personalized learning, likely accelerating the shift from time-based learning to competency-based learning</a:t>
-            </a:r>
-            <a:r>
-              <a:rPr lang="en-US" dirty="0" smtClean="0">
-                <a:solidFill>
-                  <a:schemeClr val="bg1"/>
-                </a:solidFill>
-                <a:latin typeface="Verdana" charset="0"/>
-                <a:ea typeface="Verdana" charset="0"/>
-                <a:cs typeface="Verdana" charset="0"/>
-              </a:rPr>
-              <a:t>.“</a:t>
+              <a:t>In 2017 the Department of Education proposed the National Education Technology Plan which states that “Moving forward, increasingly sophisticated technology-driven assessments will enable more powerful personalized learning, likely accelerating the shift from time-based learning to competency-based learning.“</a:t>
             </a:r>
           </a:p>
           <a:p>
@@ -3321,7 +3207,7 @@
               <a:buNone/>
             </a:pPr>
             <a:r>
-              <a:rPr lang="en-US" dirty="0" smtClean="0">
+              <a:rPr lang="en-US" dirty="0">
                 <a:solidFill>
                   <a:schemeClr val="bg1"/>
                 </a:solidFill>
@@ -3331,14 +3217,6 @@
               </a:rPr>
               <a:t>Vision Statement by Jacob Carter</a:t>
             </a:r>
-            <a:endParaRPr lang="en-US" dirty="0" smtClean="0">
-              <a:solidFill>
-                <a:schemeClr val="bg1"/>
-              </a:solidFill>
-              <a:latin typeface="Verdana" charset="0"/>
-              <a:ea typeface="Verdana" charset="0"/>
-              <a:cs typeface="Verdana" charset="0"/>
-            </a:endParaRPr>
           </a:p>
           <a:p>
             <a:pPr marL="0" indent="0">
@@ -3400,7 +3278,7 @@
           </a:lstStyle>
           <a:p>
             <a:r>
-              <a:rPr lang="en-US" spc="100" dirty="0" smtClean="0">
+              <a:rPr lang="en-US" spc="100" dirty="0">
                 <a:solidFill>
                   <a:srgbClr val="E05529"/>
                 </a:solidFill>
@@ -3410,14 +3288,6 @@
               </a:rPr>
               <a:t>Education for all</a:t>
             </a:r>
-            <a:endParaRPr lang="en-US" spc="100" dirty="0">
-              <a:solidFill>
-                <a:srgbClr val="E05529"/>
-              </a:solidFill>
-              <a:latin typeface="Impact" charset="0"/>
-              <a:ea typeface="Impact" charset="0"/>
-              <a:cs typeface="Impact" charset="0"/>
-            </a:endParaRPr>
           </a:p>
         </p:txBody>
       </p:sp>
@@ -3431,8 +3301,8 @@
         </p:nvSpPr>
         <p:spPr>
           <a:xfrm>
-            <a:off x="12292013" y="5126900"/>
-            <a:ext cx="19544199" cy="6080503"/>
+            <a:off x="12292013" y="4768925"/>
+            <a:ext cx="19544199" cy="2125074"/>
           </a:xfrm>
           <a:prstGeom prst="rect">
             <a:avLst/>
@@ -3606,18 +3476,13 @@
           </a:lstStyle>
           <a:p>
             <a:r>
-              <a:rPr lang="en-US" sz="3200" dirty="0" smtClean="0">
+              <a:rPr lang="en-US" sz="3200" b="1" dirty="0">
                 <a:latin typeface="Georgia" charset="0"/>
                 <a:ea typeface="Georgia" charset="0"/>
                 <a:cs typeface="Georgia" charset="0"/>
               </a:rPr>
               <a:t>An online program to provide opportunities for individuals who are incarcerated to obtain their GED and to gain skill that will help them adjust to the larger world upon release. </a:t>
             </a:r>
-            <a:endParaRPr lang="en-US" sz="3200" dirty="0">
-              <a:latin typeface="Georgia" charset="0"/>
-              <a:ea typeface="Georgia" charset="0"/>
-              <a:cs typeface="Georgia" charset="0"/>
-            </a:endParaRPr>
           </a:p>
         </p:txBody>
       </p:sp>
@@ -3808,20 +3673,14 @@
           </a:lstStyle>
           <a:p>
             <a:r>
-              <a:rPr lang="en-US" dirty="0" smtClean="0">
+              <a:rPr lang="en-US" dirty="0">
                 <a:solidFill>
                   <a:srgbClr val="FFFFFF"/>
                 </a:solidFill>
                 <a:latin typeface="Verdana Regular" charset="0"/>
               </a:rPr>
-              <a:t>Challenges</a:t>
-            </a:r>
-            <a:endParaRPr lang="en-US" dirty="0">
-              <a:solidFill>
-                <a:srgbClr val="FFFFFF"/>
-              </a:solidFill>
-              <a:latin typeface="Verdana Regular" charset="0"/>
-            </a:endParaRPr>
+              <a:t>Features</a:t>
+            </a:r>
           </a:p>
         </p:txBody>
       </p:sp>
@@ -3836,7 +3695,7 @@
         <p:spPr>
           <a:xfrm>
             <a:off x="33934401" y="6476963"/>
-            <a:ext cx="8126412" cy="14901515"/>
+            <a:ext cx="8126412" cy="16611022"/>
           </a:xfrm>
           <a:prstGeom prst="rect">
             <a:avLst/>
@@ -4024,10 +3883,10 @@
               </a:spcAft>
             </a:pPr>
             <a:r>
-              <a:rPr lang="en-US" dirty="0" smtClean="0">
+              <a:rPr lang="en-US" dirty="0">
                 <a:latin typeface="Verdana Regular" charset="0"/>
               </a:rPr>
-              <a:t>All team members are from different geographic locations and different time zones. We managed to find time to meet on a regular basis and maintain constant communication throughout the entire development cycle. </a:t>
+              <a:t>Students, Instructors and Administrators can login to the system by having their username/password combination authenticated.</a:t>
             </a:r>
           </a:p>
           <a:p>
@@ -4037,10 +3896,10 @@
               </a:spcAft>
             </a:pPr>
             <a:r>
-              <a:rPr lang="en-US" dirty="0" smtClean="0">
+              <a:rPr lang="en-US" dirty="0">
                 <a:latin typeface="Verdana Regular" charset="0"/>
               </a:rPr>
-              <a:t>Team quickly learn and adapt different programming languages and framework to implement this application.</a:t>
+              <a:t>Students and Instructors can view their dashboard, which displays all courses which they are enrolled in.</a:t>
             </a:r>
           </a:p>
           <a:p>
@@ -4050,10 +3909,49 @@
               </a:spcAft>
             </a:pPr>
             <a:r>
-              <a:rPr lang="en-US" dirty="0" smtClean="0">
+              <a:rPr lang="en-US" dirty="0">
                 <a:latin typeface="Verdana Regular" charset="0"/>
               </a:rPr>
-              <a:t>???</a:t>
+              <a:t>Students and Instructors can view the contents of lectures and assignments that are provided by a specific course.</a:t>
+            </a:r>
+          </a:p>
+          <a:p>
+            <a:pPr>
+              <a:spcAft>
+                <a:spcPts val="2600"/>
+              </a:spcAft>
+            </a:pPr>
+            <a:r>
+              <a:rPr lang="en-US" dirty="0">
+                <a:latin typeface="Verdana Regular" charset="0"/>
+              </a:rPr>
+              <a:t>Students can complete assignments by answering questions and submitting their work for grading.</a:t>
+            </a:r>
+          </a:p>
+          <a:p>
+            <a:pPr>
+              <a:spcAft>
+                <a:spcPts val="2600"/>
+              </a:spcAft>
+            </a:pPr>
+            <a:r>
+              <a:rPr lang="en-US" dirty="0">
+                <a:latin typeface="Verdana Regular" charset="0"/>
+              </a:rPr>
+              <a:t>Administrators can create new users by providing the correct fields for database entry.</a:t>
+            </a:r>
+          </a:p>
+          <a:p>
+            <a:pPr>
+              <a:spcAft>
+                <a:spcPts val="2600"/>
+              </a:spcAft>
+            </a:pPr>
+            <a:r>
+              <a:rPr lang="en-US" dirty="0">
+                <a:latin typeface="Verdana Regular" charset="0"/>
+              </a:rPr>
+              <a:t>Handle user authentication through state management. Prevent users from accessing pages they do not have permission to (e.g. students accessing lectures in a course they are not enrolled in).</a:t>
             </a:r>
           </a:p>
           <a:p>
@@ -4072,47 +3970,7 @@
                 <a:spcPts val="2600"/>
               </a:spcAft>
             </a:pPr>
-            <a:endParaRPr lang="en-US" dirty="0" smtClean="0">
-              <a:latin typeface="Verdana Regular" charset="0"/>
-            </a:endParaRPr>
-          </a:p>
-          <a:p>
-            <a:pPr>
-              <a:spcAft>
-                <a:spcPts val="2600"/>
-              </a:spcAft>
-            </a:pPr>
-            <a:endParaRPr lang="en-US">
-              <a:latin typeface="Verdana Regular" charset="0"/>
-            </a:endParaRPr>
-          </a:p>
-          <a:p>
-            <a:pPr>
-              <a:spcAft>
-                <a:spcPts val="2600"/>
-              </a:spcAft>
-            </a:pPr>
-            <a:endParaRPr lang="en-US" dirty="0" smtClean="0">
-              <a:latin typeface="Verdana Regular" charset="0"/>
-            </a:endParaRPr>
-          </a:p>
-          <a:p>
-            <a:pPr>
-              <a:spcAft>
-                <a:spcPts val="2600"/>
-              </a:spcAft>
-            </a:pPr>
-            <a:endParaRPr lang="en-US" dirty="0" smtClean="0">
-              <a:latin typeface="Verdana Regular" charset="0"/>
-            </a:endParaRPr>
-          </a:p>
-          <a:p>
-            <a:pPr>
-              <a:spcAft>
-                <a:spcPts val="2600"/>
-              </a:spcAft>
-            </a:pPr>
-            <a:endParaRPr lang="en-US" dirty="0" smtClean="0">
+            <a:endParaRPr lang="en-US" dirty="0">
               <a:latin typeface="Verdana Regular" charset="0"/>
             </a:endParaRPr>
           </a:p>
@@ -4132,127 +3990,39 @@
                 <a:spcPts val="2600"/>
               </a:spcAft>
             </a:pPr>
-            <a:endParaRPr lang="en-US" dirty="0" smtClean="0">
+            <a:endParaRPr lang="en-US" dirty="0">
               <a:latin typeface="Verdana Regular" charset="0"/>
             </a:endParaRPr>
           </a:p>
           <a:p>
-            <a:pPr marL="0" indent="0">
+            <a:pPr>
               <a:spcAft>
                 <a:spcPts val="2600"/>
               </a:spcAft>
-              <a:buNone/>
             </a:pPr>
-            <a:r>
-              <a:rPr lang="en-US" dirty="0" smtClean="0">
-                <a:latin typeface="Verdana Regular" charset="0"/>
-              </a:rPr>
-              <a:t>Vision Statement by:</a:t>
-            </a:r>
-            <a:br>
-              <a:rPr lang="en-US" dirty="0" smtClean="0">
-                <a:latin typeface="Verdana Regular" charset="0"/>
-              </a:rPr>
-            </a:br>
-            <a:r>
-              <a:rPr lang="en-US" dirty="0" smtClean="0">
-                <a:latin typeface="Verdana Regular" charset="0"/>
-              </a:rPr>
-              <a:t>Jacob Carter</a:t>
-            </a:r>
-          </a:p>
-          <a:p>
-            <a:pPr marL="0" indent="0">
+            <a:endParaRPr lang="en-US" dirty="0">
+              <a:latin typeface="Verdana Regular" charset="0"/>
+            </a:endParaRPr>
+          </a:p>
+          <a:p>
+            <a:pPr>
               <a:spcAft>
                 <a:spcPts val="2600"/>
               </a:spcAft>
-              <a:buNone/>
             </a:pPr>
-            <a:r>
-              <a:rPr lang="en-US" dirty="0" smtClean="0">
-                <a:latin typeface="Verdana Regular" charset="0"/>
-              </a:rPr>
-              <a:t>Design </a:t>
-            </a:r>
-            <a:r>
-              <a:rPr lang="en-US" dirty="0" smtClean="0">
-                <a:latin typeface="Verdana Regular" charset="0"/>
-              </a:rPr>
-              <a:t>and Implemented by:</a:t>
-            </a:r>
-            <a:r>
-              <a:rPr lang="en-US" dirty="0">
-                <a:latin typeface="Verdana Regular" charset="0"/>
-              </a:rPr>
-              <a:t/>
-            </a:r>
-            <a:br>
-              <a:rPr lang="en-US" dirty="0">
-                <a:latin typeface="Verdana Regular" charset="0"/>
-              </a:rPr>
-            </a:br>
-            <a:r>
-              <a:rPr lang="en-US" dirty="0" smtClean="0">
-                <a:latin typeface="Verdana Regular" charset="0"/>
-              </a:rPr>
-              <a:t>Jason Anderson</a:t>
-            </a:r>
-            <a:br>
-              <a:rPr lang="en-US" dirty="0" smtClean="0">
-                <a:latin typeface="Verdana Regular" charset="0"/>
-              </a:rPr>
-            </a:br>
-            <a:r>
-              <a:rPr lang="en-US" dirty="0" smtClean="0">
-                <a:latin typeface="Verdana Regular" charset="0"/>
-              </a:rPr>
-              <a:t>Sean Cortes</a:t>
-            </a:r>
-            <a:br>
-              <a:rPr lang="en-US" dirty="0" smtClean="0">
-                <a:latin typeface="Verdana Regular" charset="0"/>
-              </a:rPr>
-            </a:br>
-            <a:r>
-              <a:rPr lang="en-US" dirty="0" smtClean="0">
-                <a:latin typeface="Verdana Regular" charset="0"/>
-              </a:rPr>
-              <a:t>Joel Hoffman</a:t>
-            </a:r>
-            <a:br>
-              <a:rPr lang="en-US" dirty="0" smtClean="0">
-                <a:latin typeface="Verdana Regular" charset="0"/>
-              </a:rPr>
-            </a:br>
-            <a:r>
-              <a:rPr lang="en-US" dirty="0" err="1" smtClean="0">
-                <a:latin typeface="Verdana Regular" charset="0"/>
-              </a:rPr>
-              <a:t>Tingting</a:t>
-            </a:r>
-            <a:r>
-              <a:rPr lang="en-US" dirty="0" smtClean="0">
-                <a:latin typeface="Verdana Regular" charset="0"/>
-              </a:rPr>
-              <a:t> Lin</a:t>
-            </a:r>
-            <a:r>
-              <a:rPr lang="en-US" dirty="0">
-                <a:latin typeface="Verdana Regular" charset="0"/>
-              </a:rPr>
-              <a:t/>
-            </a:r>
-            <a:br>
-              <a:rPr lang="en-US" dirty="0">
-                <a:latin typeface="Verdana Regular" charset="0"/>
-              </a:rPr>
-            </a:br>
-            <a:r>
-              <a:rPr lang="en-US" dirty="0" smtClean="0">
-                <a:latin typeface="Verdana Regular" charset="0"/>
-              </a:rPr>
-              <a:t>Ting Sheppy</a:t>
-            </a:r>
+            <a:endParaRPr lang="en-US" dirty="0">
+              <a:latin typeface="Verdana Regular" charset="0"/>
+            </a:endParaRPr>
+          </a:p>
+          <a:p>
+            <a:pPr>
+              <a:spcAft>
+                <a:spcPts val="2600"/>
+              </a:spcAft>
+            </a:pPr>
+            <a:endParaRPr lang="en-US" dirty="0">
+              <a:latin typeface="Verdana Regular" charset="0"/>
+            </a:endParaRPr>
           </a:p>
         </p:txBody>
       </p:sp>
@@ -4310,30 +4080,154 @@
           </a:p>
         </p:txBody>
       </p:sp>
+      <p:sp>
+        <p:nvSpPr>
+          <p:cNvPr id="22" name="TextBox 21">
+            <a:extLst>
+              <a:ext uri="{FF2B5EF4-FFF2-40B4-BE49-F238E27FC236}">
+                <a16:creationId xmlns:a16="http://schemas.microsoft.com/office/drawing/2014/main" id="{6729EDF7-608C-4ED8-9A74-9B9E3A73D535}"/>
+              </a:ext>
+            </a:extLst>
+          </p:cNvPr>
+          <p:cNvSpPr txBox="1"/>
+          <p:nvPr/>
+        </p:nvSpPr>
+        <p:spPr>
+          <a:xfrm>
+            <a:off x="27446041" y="7216405"/>
+            <a:ext cx="5202969" cy="6370975"/>
+          </a:xfrm>
+          <a:prstGeom prst="rect">
+            <a:avLst/>
+          </a:prstGeom>
+          <a:noFill/>
+        </p:spPr>
+        <p:txBody>
+          <a:bodyPr wrap="square" rtlCol="0">
+            <a:spAutoFit/>
+          </a:bodyPr>
+          <a:lstStyle/>
+          <a:p>
+            <a:r>
+              <a:rPr lang="en-US" sz="4400" dirty="0">
+                <a:solidFill>
+                  <a:srgbClr val="E05529"/>
+                </a:solidFill>
+                <a:latin typeface="Verdana Regular" charset="0"/>
+              </a:rPr>
+              <a:t>Front-End</a:t>
+            </a:r>
+          </a:p>
+          <a:p>
+            <a:r>
+              <a:rPr lang="en-US" sz="2800" b="1" dirty="0">
+                <a:latin typeface="Verdana Regular"/>
+              </a:rPr>
+              <a:t>Handlebars.js, Javascript, HTML/CSS</a:t>
+            </a:r>
+          </a:p>
+          <a:p>
+            <a:pPr marL="457200" indent="-457200">
+              <a:buFont typeface="Arial" panose="020B0604020202020204" pitchFamily="34" charset="0"/>
+              <a:buChar char="•"/>
+            </a:pPr>
+            <a:r>
+              <a:rPr lang="en-US" sz="2800" dirty="0">
+                <a:latin typeface="Verdana Regular"/>
+              </a:rPr>
+              <a:t>Handlebars is a key framework which enabled us to dynamically render data which is queried from our back-end.</a:t>
+            </a:r>
+          </a:p>
+          <a:p>
+            <a:pPr marL="457200" indent="-457200">
+              <a:buFont typeface="Arial" panose="020B0604020202020204" pitchFamily="34" charset="0"/>
+              <a:buChar char="•"/>
+            </a:pPr>
+            <a:r>
+              <a:rPr lang="en-US" sz="2800" dirty="0">
+                <a:latin typeface="Verdana Regular"/>
+              </a:rPr>
+              <a:t>Templates and partials drastically reduced the amount of HTML  elements we had to code. </a:t>
+            </a:r>
+          </a:p>
+        </p:txBody>
+      </p:sp>
+      <p:sp>
+        <p:nvSpPr>
+          <p:cNvPr id="25" name="Rectangle 24">
+            <a:extLst>
+              <a:ext uri="{FF2B5EF4-FFF2-40B4-BE49-F238E27FC236}">
+                <a16:creationId xmlns:a16="http://schemas.microsoft.com/office/drawing/2014/main" id="{61E156B5-6D5E-427A-8DFB-687DE1114674}"/>
+              </a:ext>
+            </a:extLst>
+          </p:cNvPr>
+          <p:cNvSpPr/>
+          <p:nvPr/>
+        </p:nvSpPr>
+        <p:spPr>
+          <a:xfrm>
+            <a:off x="16573500" y="14493950"/>
+            <a:ext cx="16075511" cy="7125871"/>
+          </a:xfrm>
+          <a:prstGeom prst="rect">
+            <a:avLst/>
+          </a:prstGeom>
+          <a:solidFill>
+            <a:schemeClr val="tx1">
+              <a:lumMod val="75000"/>
+              <a:lumOff val="25000"/>
+            </a:schemeClr>
+          </a:solidFill>
+        </p:spPr>
+        <p:style>
+          <a:lnRef idx="2">
+            <a:schemeClr val="accent1">
+              <a:shade val="50000"/>
+            </a:schemeClr>
+          </a:lnRef>
+          <a:fillRef idx="1">
+            <a:schemeClr val="accent1"/>
+          </a:fillRef>
+          <a:effectRef idx="0">
+            <a:schemeClr val="accent1"/>
+          </a:effectRef>
+          <a:fontRef idx="minor">
+            <a:schemeClr val="lt1"/>
+          </a:fontRef>
+        </p:style>
+        <p:txBody>
+          <a:bodyPr rtlCol="0" anchor="ctr"/>
+          <a:lstStyle/>
+          <a:p>
+            <a:pPr algn="ctr"/>
+            <a:endParaRPr lang="en-US"/>
+          </a:p>
+        </p:txBody>
+      </p:sp>
       <p:pic>
         <p:nvPicPr>
-          <p:cNvPr id="18" name="Picture 17"/>
+          <p:cNvPr id="26" name="Picture 25">
+            <a:extLst>
+              <a:ext uri="{FF2B5EF4-FFF2-40B4-BE49-F238E27FC236}">
+                <a16:creationId xmlns:a16="http://schemas.microsoft.com/office/drawing/2014/main" id="{2B395AB2-E5BF-4792-A58D-8CAD5CCF648B}"/>
+              </a:ext>
+            </a:extLst>
+          </p:cNvPr>
           <p:cNvPicPr>
             <a:picLocks noChangeAspect="1"/>
           </p:cNvPicPr>
           <p:nvPr/>
         </p:nvPicPr>
         <p:blipFill>
-          <a:blip r:embed="rId2">
-            <a:extLst>
-              <a:ext uri="{28A0092B-C50C-407E-A947-70E740481C1C}">
-                <a14:useLocalDpi xmlns:a14="http://schemas.microsoft.com/office/drawing/2010/main" val="0"/>
-              </a:ext>
-            </a:extLst>
-          </a:blip>
+          <a:blip r:embed="rId2"/>
           <a:stretch>
             <a:fillRect/>
           </a:stretch>
         </p:blipFill>
         <p:spPr>
           <a:xfrm>
-            <a:off x="12911393" y="7436362"/>
-            <a:ext cx="7507694" cy="6279638"/>
+            <a:off x="16758327" y="14697168"/>
+            <a:ext cx="9587398" cy="6770979"/>
           </a:xfrm>
           <a:prstGeom prst="rect">
             <a:avLst/>
@@ -4342,34 +4236,1115 @@
       </p:pic>
       <p:pic>
         <p:nvPicPr>
-          <p:cNvPr id="19" name="Picture 18"/>
+          <p:cNvPr id="27" name="Picture 26">
+            <a:extLst>
+              <a:ext uri="{FF2B5EF4-FFF2-40B4-BE49-F238E27FC236}">
+                <a16:creationId xmlns:a16="http://schemas.microsoft.com/office/drawing/2014/main" id="{9E7374F2-8071-4430-82B8-73E6CBDC6E5E}"/>
+              </a:ext>
+            </a:extLst>
+          </p:cNvPr>
           <p:cNvPicPr>
             <a:picLocks noChangeAspect="1"/>
           </p:cNvPicPr>
           <p:nvPr/>
         </p:nvPicPr>
         <p:blipFill>
-          <a:blip r:embed="rId3">
-            <a:extLst>
-              <a:ext uri="{28A0092B-C50C-407E-A947-70E740481C1C}">
-                <a14:useLocalDpi xmlns:a14="http://schemas.microsoft.com/office/drawing/2010/main" val="0"/>
-              </a:ext>
-            </a:extLst>
-          </a:blip>
+          <a:blip r:embed="rId3"/>
           <a:stretch>
             <a:fillRect/>
           </a:stretch>
         </p:blipFill>
         <p:spPr>
           <a:xfrm>
-            <a:off x="14093691" y="14114695"/>
-            <a:ext cx="6285757" cy="7484675"/>
+            <a:off x="26472913" y="14670242"/>
+            <a:ext cx="6001224" cy="6797905"/>
           </a:xfrm>
           <a:prstGeom prst="rect">
             <a:avLst/>
           </a:prstGeom>
         </p:spPr>
       </p:pic>
+      <p:sp>
+        <p:nvSpPr>
+          <p:cNvPr id="28" name="TextBox 27">
+            <a:extLst>
+              <a:ext uri="{FF2B5EF4-FFF2-40B4-BE49-F238E27FC236}">
+                <a16:creationId xmlns:a16="http://schemas.microsoft.com/office/drawing/2014/main" id="{E421AC65-81E6-40D0-9D70-D8C059E28A99}"/>
+              </a:ext>
+            </a:extLst>
+          </p:cNvPr>
+          <p:cNvSpPr txBox="1"/>
+          <p:nvPr/>
+        </p:nvSpPr>
+        <p:spPr>
+          <a:xfrm>
+            <a:off x="11242918" y="14493950"/>
+            <a:ext cx="5330583" cy="7232749"/>
+          </a:xfrm>
+          <a:prstGeom prst="rect">
+            <a:avLst/>
+          </a:prstGeom>
+          <a:noFill/>
+        </p:spPr>
+        <p:txBody>
+          <a:bodyPr wrap="square" rtlCol="0">
+            <a:spAutoFit/>
+          </a:bodyPr>
+          <a:lstStyle/>
+          <a:p>
+            <a:r>
+              <a:rPr lang="en-US" sz="4400" dirty="0">
+                <a:solidFill>
+                  <a:srgbClr val="E05529"/>
+                </a:solidFill>
+                <a:latin typeface="Verdana Regular" charset="0"/>
+              </a:rPr>
+              <a:t>Back-end</a:t>
+            </a:r>
+          </a:p>
+          <a:p>
+            <a:r>
+              <a:rPr lang="en-US" sz="2800" b="1" dirty="0">
+                <a:latin typeface="Verdana Regular"/>
+              </a:rPr>
+              <a:t>Node.js, Javascript, MySQL</a:t>
+            </a:r>
+          </a:p>
+          <a:p>
+            <a:pPr marL="457200" indent="-457200">
+              <a:buFont typeface="Arial" panose="020B0604020202020204" pitchFamily="34" charset="0"/>
+              <a:buChar char="•"/>
+            </a:pPr>
+            <a:r>
+              <a:rPr lang="en-US" sz="2800" dirty="0">
+                <a:latin typeface="Verdana Regular"/>
+              </a:rPr>
+              <a:t>All data is stored in a MySQL database and structured to be in 1NF (2NF easily obtainable).</a:t>
+            </a:r>
+          </a:p>
+          <a:p>
+            <a:pPr marL="457200" indent="-457200">
+              <a:buFont typeface="Arial" panose="020B0604020202020204" pitchFamily="34" charset="0"/>
+              <a:buChar char="•"/>
+            </a:pPr>
+            <a:r>
+              <a:rPr lang="en-US" sz="2800" dirty="0">
+                <a:latin typeface="Verdana Regular"/>
+              </a:rPr>
+              <a:t>Node-Express handles routing, querying, and compiling objects to be sent to the front-end for rendering.</a:t>
+            </a:r>
+          </a:p>
+          <a:p>
+            <a:pPr marL="457200" indent="-457200">
+              <a:buFont typeface="Arial" panose="020B0604020202020204" pitchFamily="34" charset="0"/>
+              <a:buChar char="•"/>
+            </a:pPr>
+            <a:r>
+              <a:rPr lang="en-US" sz="2800" dirty="0">
+                <a:latin typeface="Verdana Regular"/>
+              </a:rPr>
+              <a:t>Express-Sessions and middleware functions allows us to handle user authentication via state.</a:t>
+            </a:r>
+          </a:p>
+        </p:txBody>
+      </p:sp>
+      <p:sp>
+        <p:nvSpPr>
+          <p:cNvPr id="31" name="Rectangle 30">
+            <a:extLst>
+              <a:ext uri="{FF2B5EF4-FFF2-40B4-BE49-F238E27FC236}">
+                <a16:creationId xmlns:a16="http://schemas.microsoft.com/office/drawing/2014/main" id="{5EAD9B0C-8C6F-435D-81A4-80E455F735AF}"/>
+              </a:ext>
+            </a:extLst>
+          </p:cNvPr>
+          <p:cNvSpPr/>
+          <p:nvPr/>
+        </p:nvSpPr>
+        <p:spPr>
+          <a:xfrm>
+            <a:off x="11285294" y="7216405"/>
+            <a:ext cx="16075511" cy="7125871"/>
+          </a:xfrm>
+          <a:prstGeom prst="rect">
+            <a:avLst/>
+          </a:prstGeom>
+          <a:solidFill>
+            <a:schemeClr val="tx1">
+              <a:lumMod val="75000"/>
+              <a:lumOff val="25000"/>
+            </a:schemeClr>
+          </a:solidFill>
+        </p:spPr>
+        <p:style>
+          <a:lnRef idx="2">
+            <a:schemeClr val="accent1">
+              <a:shade val="50000"/>
+            </a:schemeClr>
+          </a:lnRef>
+          <a:fillRef idx="1">
+            <a:schemeClr val="accent1"/>
+          </a:fillRef>
+          <a:effectRef idx="0">
+            <a:schemeClr val="accent1"/>
+          </a:effectRef>
+          <a:fontRef idx="minor">
+            <a:schemeClr val="lt1"/>
+          </a:fontRef>
+        </p:style>
+        <p:txBody>
+          <a:bodyPr rtlCol="0" anchor="ctr"/>
+          <a:lstStyle/>
+          <a:p>
+            <a:pPr algn="ctr"/>
+            <a:endParaRPr lang="en-US"/>
+          </a:p>
+        </p:txBody>
+      </p:sp>
+      <p:pic>
+        <p:nvPicPr>
+          <p:cNvPr id="32" name="Picture 31">
+            <a:extLst>
+              <a:ext uri="{FF2B5EF4-FFF2-40B4-BE49-F238E27FC236}">
+                <a16:creationId xmlns:a16="http://schemas.microsoft.com/office/drawing/2014/main" id="{56922CCB-6A1B-4543-ACFD-900323F83B19}"/>
+              </a:ext>
+            </a:extLst>
+          </p:cNvPr>
+          <p:cNvPicPr>
+            <a:picLocks noChangeAspect="1"/>
+          </p:cNvPicPr>
+          <p:nvPr/>
+        </p:nvPicPr>
+        <p:blipFill>
+          <a:blip r:embed="rId4"/>
+          <a:stretch>
+            <a:fillRect/>
+          </a:stretch>
+        </p:blipFill>
+        <p:spPr>
+          <a:xfrm>
+            <a:off x="11418403" y="7361403"/>
+            <a:ext cx="9841397" cy="6889494"/>
+          </a:xfrm>
+          <a:prstGeom prst="rect">
+            <a:avLst/>
+          </a:prstGeom>
+        </p:spPr>
+      </p:pic>
+      <p:pic>
+        <p:nvPicPr>
+          <p:cNvPr id="33" name="Picture 32">
+            <a:extLst>
+              <a:ext uri="{FF2B5EF4-FFF2-40B4-BE49-F238E27FC236}">
+                <a16:creationId xmlns:a16="http://schemas.microsoft.com/office/drawing/2014/main" id="{964136B6-7FB6-49B8-B432-FA924CB648BD}"/>
+              </a:ext>
+            </a:extLst>
+          </p:cNvPr>
+          <p:cNvPicPr>
+            <a:picLocks noChangeAspect="1"/>
+          </p:cNvPicPr>
+          <p:nvPr/>
+        </p:nvPicPr>
+        <p:blipFill>
+          <a:blip r:embed="rId5"/>
+          <a:stretch>
+            <a:fillRect/>
+          </a:stretch>
+        </p:blipFill>
+        <p:spPr>
+          <a:xfrm>
+            <a:off x="21386988" y="7347284"/>
+            <a:ext cx="5889823" cy="6889495"/>
+          </a:xfrm>
+          <a:prstGeom prst="rect">
+            <a:avLst/>
+          </a:prstGeom>
+        </p:spPr>
+      </p:pic>
+      <p:sp>
+        <p:nvSpPr>
+          <p:cNvPr id="34" name="Text Placeholder 18">
+            <a:extLst>
+              <a:ext uri="{FF2B5EF4-FFF2-40B4-BE49-F238E27FC236}">
+                <a16:creationId xmlns:a16="http://schemas.microsoft.com/office/drawing/2014/main" id="{DE9D67B0-4F5D-4165-879B-DB0472B38F40}"/>
+              </a:ext>
+            </a:extLst>
+          </p:cNvPr>
+          <p:cNvSpPr txBox="1">
+            <a:spLocks/>
+          </p:cNvSpPr>
+          <p:nvPr/>
+        </p:nvSpPr>
+        <p:spPr>
+          <a:xfrm>
+            <a:off x="33969060" y="18862701"/>
+            <a:ext cx="8126412" cy="11686597"/>
+          </a:xfrm>
+          <a:prstGeom prst="rect">
+            <a:avLst/>
+          </a:prstGeom>
+        </p:spPr>
+        <p:txBody>
+          <a:bodyPr wrap="square" lIns="0" tIns="0" rIns="0" bIns="0">
+            <a:spAutoFit/>
+          </a:bodyPr>
+          <a:lstStyle>
+            <a:lvl1pPr marL="457200" marR="0" indent="-457200" algn="l" defTabSz="4389120" rtl="0" eaLnBrk="1" fontAlgn="auto" latinLnBrk="0" hangingPunct="1">
+              <a:lnSpc>
+                <a:spcPts val="3360"/>
+              </a:lnSpc>
+              <a:spcBef>
+                <a:spcPts val="0"/>
+              </a:spcBef>
+              <a:spcAft>
+                <a:spcPts val="800"/>
+              </a:spcAft>
+              <a:buClrTx/>
+              <a:buSzTx/>
+              <a:buFont typeface="Arial" charset="0"/>
+              <a:buChar char="•"/>
+              <a:tabLst/>
+              <a:defRPr lang="en-US" sz="2800" kern="1200" baseline="0" smtClean="0">
+                <a:solidFill>
+                  <a:schemeClr val="tx1"/>
+                </a:solidFill>
+                <a:effectLst/>
+                <a:latin typeface="KievitPro-Regular" charset="0"/>
+                <a:ea typeface="+mn-ea"/>
+                <a:cs typeface="+mn-cs"/>
+              </a:defRPr>
+            </a:lvl1pPr>
+            <a:lvl2pPr marL="2194560" indent="0" algn="l" defTabSz="4389120" rtl="0" eaLnBrk="1" latinLnBrk="0" hangingPunct="1">
+              <a:lnSpc>
+                <a:spcPct val="90000"/>
+              </a:lnSpc>
+              <a:spcBef>
+                <a:spcPts val="2400"/>
+              </a:spcBef>
+              <a:buFontTx/>
+              <a:buNone/>
+              <a:defRPr sz="2800" kern="1200">
+                <a:solidFill>
+                  <a:schemeClr val="tx1"/>
+                </a:solidFill>
+                <a:latin typeface="+mn-lt"/>
+                <a:ea typeface="+mn-ea"/>
+                <a:cs typeface="+mn-cs"/>
+              </a:defRPr>
+            </a:lvl2pPr>
+            <a:lvl3pPr marL="4389120" indent="0" algn="l" defTabSz="4389120" rtl="0" eaLnBrk="1" latinLnBrk="0" hangingPunct="1">
+              <a:lnSpc>
+                <a:spcPct val="90000"/>
+              </a:lnSpc>
+              <a:spcBef>
+                <a:spcPts val="2400"/>
+              </a:spcBef>
+              <a:buFontTx/>
+              <a:buNone/>
+              <a:defRPr sz="9600" kern="1200">
+                <a:solidFill>
+                  <a:schemeClr val="tx1"/>
+                </a:solidFill>
+                <a:latin typeface="+mn-lt"/>
+                <a:ea typeface="+mn-ea"/>
+                <a:cs typeface="+mn-cs"/>
+              </a:defRPr>
+            </a:lvl3pPr>
+            <a:lvl4pPr marL="6583680" indent="0" algn="l" defTabSz="4389120" rtl="0" eaLnBrk="1" latinLnBrk="0" hangingPunct="1">
+              <a:lnSpc>
+                <a:spcPct val="90000"/>
+              </a:lnSpc>
+              <a:spcBef>
+                <a:spcPts val="2400"/>
+              </a:spcBef>
+              <a:buFontTx/>
+              <a:buNone/>
+              <a:defRPr sz="8640" kern="1200">
+                <a:solidFill>
+                  <a:schemeClr val="tx1"/>
+                </a:solidFill>
+                <a:latin typeface="+mn-lt"/>
+                <a:ea typeface="+mn-ea"/>
+                <a:cs typeface="+mn-cs"/>
+              </a:defRPr>
+            </a:lvl4pPr>
+            <a:lvl5pPr marL="8778240" indent="0" algn="l" defTabSz="4389120" rtl="0" eaLnBrk="1" latinLnBrk="0" hangingPunct="1">
+              <a:lnSpc>
+                <a:spcPct val="90000"/>
+              </a:lnSpc>
+              <a:spcBef>
+                <a:spcPts val="2400"/>
+              </a:spcBef>
+              <a:buFontTx/>
+              <a:buNone/>
+              <a:defRPr sz="8640" kern="1200">
+                <a:solidFill>
+                  <a:schemeClr val="tx1"/>
+                </a:solidFill>
+                <a:latin typeface="+mn-lt"/>
+                <a:ea typeface="+mn-ea"/>
+                <a:cs typeface="+mn-cs"/>
+              </a:defRPr>
+            </a:lvl5pPr>
+            <a:lvl6pPr marL="12070080" indent="-1097280" algn="l" defTabSz="4389120" rtl="0" eaLnBrk="1" latinLnBrk="0" hangingPunct="1">
+              <a:lnSpc>
+                <a:spcPct val="90000"/>
+              </a:lnSpc>
+              <a:spcBef>
+                <a:spcPts val="2400"/>
+              </a:spcBef>
+              <a:buFont typeface="Arial" panose="020B0604020202020204" pitchFamily="34" charset="0"/>
+              <a:buChar char="•"/>
+              <a:defRPr sz="8640" kern="1200">
+                <a:solidFill>
+                  <a:schemeClr val="tx1"/>
+                </a:solidFill>
+                <a:latin typeface="+mn-lt"/>
+                <a:ea typeface="+mn-ea"/>
+                <a:cs typeface="+mn-cs"/>
+              </a:defRPr>
+            </a:lvl6pPr>
+            <a:lvl7pPr marL="14264640" indent="-1097280" algn="l" defTabSz="4389120" rtl="0" eaLnBrk="1" latinLnBrk="0" hangingPunct="1">
+              <a:lnSpc>
+                <a:spcPct val="90000"/>
+              </a:lnSpc>
+              <a:spcBef>
+                <a:spcPts val="2400"/>
+              </a:spcBef>
+              <a:buFont typeface="Arial" panose="020B0604020202020204" pitchFamily="34" charset="0"/>
+              <a:buChar char="•"/>
+              <a:defRPr sz="8640" kern="1200">
+                <a:solidFill>
+                  <a:schemeClr val="tx1"/>
+                </a:solidFill>
+                <a:latin typeface="+mn-lt"/>
+                <a:ea typeface="+mn-ea"/>
+                <a:cs typeface="+mn-cs"/>
+              </a:defRPr>
+            </a:lvl7pPr>
+            <a:lvl8pPr marL="16459200" indent="-1097280" algn="l" defTabSz="4389120" rtl="0" eaLnBrk="1" latinLnBrk="0" hangingPunct="1">
+              <a:lnSpc>
+                <a:spcPct val="90000"/>
+              </a:lnSpc>
+              <a:spcBef>
+                <a:spcPts val="2400"/>
+              </a:spcBef>
+              <a:buFont typeface="Arial" panose="020B0604020202020204" pitchFamily="34" charset="0"/>
+              <a:buChar char="•"/>
+              <a:defRPr sz="8640" kern="1200">
+                <a:solidFill>
+                  <a:schemeClr val="tx1"/>
+                </a:solidFill>
+                <a:latin typeface="+mn-lt"/>
+                <a:ea typeface="+mn-ea"/>
+                <a:cs typeface="+mn-cs"/>
+              </a:defRPr>
+            </a:lvl8pPr>
+            <a:lvl9pPr marL="18653760" indent="-1097280" algn="l" defTabSz="4389120" rtl="0" eaLnBrk="1" latinLnBrk="0" hangingPunct="1">
+              <a:lnSpc>
+                <a:spcPct val="90000"/>
+              </a:lnSpc>
+              <a:spcBef>
+                <a:spcPts val="2400"/>
+              </a:spcBef>
+              <a:buFont typeface="Arial" panose="020B0604020202020204" pitchFamily="34" charset="0"/>
+              <a:buChar char="•"/>
+              <a:defRPr sz="8640" kern="1200">
+                <a:solidFill>
+                  <a:schemeClr val="tx1"/>
+                </a:solidFill>
+                <a:latin typeface="+mn-lt"/>
+                <a:ea typeface="+mn-ea"/>
+                <a:cs typeface="+mn-cs"/>
+              </a:defRPr>
+            </a:lvl9pPr>
+          </a:lstStyle>
+          <a:p>
+            <a:pPr>
+              <a:spcAft>
+                <a:spcPts val="2600"/>
+              </a:spcAft>
+            </a:pPr>
+            <a:r>
+              <a:rPr lang="en-US" dirty="0">
+                <a:latin typeface="Verdana Regular" charset="0"/>
+              </a:rPr>
+              <a:t>Instructors can create lectures and assignments to be submitted into the database for integration with a chosen course.</a:t>
+            </a:r>
+          </a:p>
+          <a:p>
+            <a:pPr>
+              <a:spcAft>
+                <a:spcPts val="2600"/>
+              </a:spcAft>
+            </a:pPr>
+            <a:r>
+              <a:rPr lang="en-US" dirty="0">
+                <a:latin typeface="Verdana Regular" charset="0"/>
+              </a:rPr>
+              <a:t>Education Planner for students which enables them to plan which courses they study ahead of time. </a:t>
+            </a:r>
+          </a:p>
+          <a:p>
+            <a:pPr>
+              <a:spcAft>
+                <a:spcPts val="2600"/>
+              </a:spcAft>
+            </a:pPr>
+            <a:r>
+              <a:rPr lang="en-US" dirty="0">
+                <a:latin typeface="Verdana Regular" charset="0"/>
+              </a:rPr>
+              <a:t>Education progress page which provides students with a road map of the courses they have completed.</a:t>
+            </a:r>
+          </a:p>
+          <a:p>
+            <a:pPr>
+              <a:spcAft>
+                <a:spcPts val="2600"/>
+              </a:spcAft>
+            </a:pPr>
+            <a:r>
+              <a:rPr lang="en-US" dirty="0">
+                <a:latin typeface="Verdana Regular" charset="0"/>
+              </a:rPr>
+              <a:t>Message board for each course which gives students and instructors a method of interacting and collaborating with each other.</a:t>
+            </a:r>
+          </a:p>
+          <a:p>
+            <a:pPr>
+              <a:spcAft>
+                <a:spcPts val="2600"/>
+              </a:spcAft>
+            </a:pPr>
+            <a:endParaRPr lang="en-US" dirty="0">
+              <a:latin typeface="Verdana Regular" charset="0"/>
+            </a:endParaRPr>
+          </a:p>
+          <a:p>
+            <a:pPr>
+              <a:spcAft>
+                <a:spcPts val="2600"/>
+              </a:spcAft>
+            </a:pPr>
+            <a:endParaRPr lang="en-US" dirty="0">
+              <a:latin typeface="Verdana Regular" charset="0"/>
+            </a:endParaRPr>
+          </a:p>
+          <a:p>
+            <a:pPr>
+              <a:spcAft>
+                <a:spcPts val="2600"/>
+              </a:spcAft>
+            </a:pPr>
+            <a:endParaRPr lang="en-US" dirty="0">
+              <a:latin typeface="Verdana Regular" charset="0"/>
+            </a:endParaRPr>
+          </a:p>
+          <a:p>
+            <a:pPr>
+              <a:spcAft>
+                <a:spcPts val="2600"/>
+              </a:spcAft>
+            </a:pPr>
+            <a:endParaRPr lang="en-US" dirty="0">
+              <a:latin typeface="Verdana Regular" charset="0"/>
+            </a:endParaRPr>
+          </a:p>
+          <a:p>
+            <a:pPr>
+              <a:spcAft>
+                <a:spcPts val="2600"/>
+              </a:spcAft>
+            </a:pPr>
+            <a:endParaRPr lang="en-US" dirty="0">
+              <a:latin typeface="Verdana Regular" charset="0"/>
+            </a:endParaRPr>
+          </a:p>
+          <a:p>
+            <a:pPr>
+              <a:spcAft>
+                <a:spcPts val="2600"/>
+              </a:spcAft>
+            </a:pPr>
+            <a:endParaRPr lang="en-US" dirty="0">
+              <a:latin typeface="Verdana Regular" charset="0"/>
+            </a:endParaRPr>
+          </a:p>
+        </p:txBody>
+      </p:sp>
+      <p:sp>
+        <p:nvSpPr>
+          <p:cNvPr id="35" name="Text Placeholder 16">
+            <a:extLst>
+              <a:ext uri="{FF2B5EF4-FFF2-40B4-BE49-F238E27FC236}">
+                <a16:creationId xmlns:a16="http://schemas.microsoft.com/office/drawing/2014/main" id="{8196B3FB-4912-4EB9-98D4-DFBC5C874AEE}"/>
+              </a:ext>
+            </a:extLst>
+          </p:cNvPr>
+          <p:cNvSpPr txBox="1">
+            <a:spLocks/>
+          </p:cNvSpPr>
+          <p:nvPr/>
+        </p:nvSpPr>
+        <p:spPr>
+          <a:xfrm>
+            <a:off x="33902123" y="17917920"/>
+            <a:ext cx="8158690" cy="664797"/>
+          </a:xfrm>
+          <a:prstGeom prst="rect">
+            <a:avLst/>
+          </a:prstGeom>
+        </p:spPr>
+        <p:txBody>
+          <a:bodyPr wrap="square" lIns="0" tIns="0" rIns="0" bIns="0">
+            <a:spAutoFit/>
+          </a:bodyPr>
+          <a:lstStyle>
+            <a:lvl1pPr marL="0" indent="0" algn="l" defTabSz="4389120" rtl="0" eaLnBrk="1" latinLnBrk="0" hangingPunct="1">
+              <a:lnSpc>
+                <a:spcPct val="90000"/>
+              </a:lnSpc>
+              <a:spcBef>
+                <a:spcPts val="4800"/>
+              </a:spcBef>
+              <a:buFontTx/>
+              <a:buNone/>
+              <a:defRPr sz="4800" kern="1200" cap="all" baseline="0">
+                <a:solidFill>
+                  <a:schemeClr val="tx1"/>
+                </a:solidFill>
+                <a:latin typeface="KievitPro-Medium" charset="0"/>
+                <a:ea typeface="+mn-ea"/>
+                <a:cs typeface="+mn-cs"/>
+              </a:defRPr>
+            </a:lvl1pPr>
+            <a:lvl2pPr marL="2194560" indent="0" algn="l" defTabSz="4389120" rtl="0" eaLnBrk="1" latinLnBrk="0" hangingPunct="1">
+              <a:lnSpc>
+                <a:spcPct val="90000"/>
+              </a:lnSpc>
+              <a:spcBef>
+                <a:spcPts val="2400"/>
+              </a:spcBef>
+              <a:buFontTx/>
+              <a:buNone/>
+              <a:defRPr sz="4800" kern="1200" cap="all" baseline="0">
+                <a:solidFill>
+                  <a:schemeClr val="tx1"/>
+                </a:solidFill>
+                <a:latin typeface="KievitPro-Medium" charset="0"/>
+                <a:ea typeface="+mn-ea"/>
+                <a:cs typeface="+mn-cs"/>
+              </a:defRPr>
+            </a:lvl2pPr>
+            <a:lvl3pPr marL="4389120" indent="0" algn="l" defTabSz="4389120" rtl="0" eaLnBrk="1" latinLnBrk="0" hangingPunct="1">
+              <a:lnSpc>
+                <a:spcPct val="90000"/>
+              </a:lnSpc>
+              <a:spcBef>
+                <a:spcPts val="2400"/>
+              </a:spcBef>
+              <a:buFontTx/>
+              <a:buNone/>
+              <a:defRPr sz="4800" kern="1200" cap="all" baseline="0">
+                <a:solidFill>
+                  <a:schemeClr val="tx1"/>
+                </a:solidFill>
+                <a:latin typeface="KievitPro-Medium" charset="0"/>
+                <a:ea typeface="+mn-ea"/>
+                <a:cs typeface="+mn-cs"/>
+              </a:defRPr>
+            </a:lvl3pPr>
+            <a:lvl4pPr marL="6583680" indent="0" algn="l" defTabSz="4389120" rtl="0" eaLnBrk="1" latinLnBrk="0" hangingPunct="1">
+              <a:lnSpc>
+                <a:spcPct val="90000"/>
+              </a:lnSpc>
+              <a:spcBef>
+                <a:spcPts val="2400"/>
+              </a:spcBef>
+              <a:buFontTx/>
+              <a:buNone/>
+              <a:defRPr sz="4800" kern="1200" cap="all" baseline="0">
+                <a:solidFill>
+                  <a:schemeClr val="tx1"/>
+                </a:solidFill>
+                <a:latin typeface="KievitPro-Medium" charset="0"/>
+                <a:ea typeface="+mn-ea"/>
+                <a:cs typeface="+mn-cs"/>
+              </a:defRPr>
+            </a:lvl4pPr>
+            <a:lvl5pPr marL="8778240" indent="0" algn="l" defTabSz="4389120" rtl="0" eaLnBrk="1" latinLnBrk="0" hangingPunct="1">
+              <a:lnSpc>
+                <a:spcPct val="90000"/>
+              </a:lnSpc>
+              <a:spcBef>
+                <a:spcPts val="2400"/>
+              </a:spcBef>
+              <a:buFontTx/>
+              <a:buNone/>
+              <a:defRPr sz="4800" kern="1200" cap="all" baseline="0">
+                <a:solidFill>
+                  <a:schemeClr val="tx1"/>
+                </a:solidFill>
+                <a:latin typeface="KievitPro-Medium" charset="0"/>
+                <a:ea typeface="+mn-ea"/>
+                <a:cs typeface="+mn-cs"/>
+              </a:defRPr>
+            </a:lvl5pPr>
+            <a:lvl6pPr marL="12070080" indent="-1097280" algn="l" defTabSz="4389120" rtl="0" eaLnBrk="1" latinLnBrk="0" hangingPunct="1">
+              <a:lnSpc>
+                <a:spcPct val="90000"/>
+              </a:lnSpc>
+              <a:spcBef>
+                <a:spcPts val="2400"/>
+              </a:spcBef>
+              <a:buFont typeface="Arial" panose="020B0604020202020204" pitchFamily="34" charset="0"/>
+              <a:buChar char="•"/>
+              <a:defRPr sz="8640" kern="1200">
+                <a:solidFill>
+                  <a:schemeClr val="tx1"/>
+                </a:solidFill>
+                <a:latin typeface="+mn-lt"/>
+                <a:ea typeface="+mn-ea"/>
+                <a:cs typeface="+mn-cs"/>
+              </a:defRPr>
+            </a:lvl6pPr>
+            <a:lvl7pPr marL="14264640" indent="-1097280" algn="l" defTabSz="4389120" rtl="0" eaLnBrk="1" latinLnBrk="0" hangingPunct="1">
+              <a:lnSpc>
+                <a:spcPct val="90000"/>
+              </a:lnSpc>
+              <a:spcBef>
+                <a:spcPts val="2400"/>
+              </a:spcBef>
+              <a:buFont typeface="Arial" panose="020B0604020202020204" pitchFamily="34" charset="0"/>
+              <a:buChar char="•"/>
+              <a:defRPr sz="8640" kern="1200">
+                <a:solidFill>
+                  <a:schemeClr val="tx1"/>
+                </a:solidFill>
+                <a:latin typeface="+mn-lt"/>
+                <a:ea typeface="+mn-ea"/>
+                <a:cs typeface="+mn-cs"/>
+              </a:defRPr>
+            </a:lvl7pPr>
+            <a:lvl8pPr marL="16459200" indent="-1097280" algn="l" defTabSz="4389120" rtl="0" eaLnBrk="1" latinLnBrk="0" hangingPunct="1">
+              <a:lnSpc>
+                <a:spcPct val="90000"/>
+              </a:lnSpc>
+              <a:spcBef>
+                <a:spcPts val="2400"/>
+              </a:spcBef>
+              <a:buFont typeface="Arial" panose="020B0604020202020204" pitchFamily="34" charset="0"/>
+              <a:buChar char="•"/>
+              <a:defRPr sz="8640" kern="1200">
+                <a:solidFill>
+                  <a:schemeClr val="tx1"/>
+                </a:solidFill>
+                <a:latin typeface="+mn-lt"/>
+                <a:ea typeface="+mn-ea"/>
+                <a:cs typeface="+mn-cs"/>
+              </a:defRPr>
+            </a:lvl8pPr>
+            <a:lvl9pPr marL="18653760" indent="-1097280" algn="l" defTabSz="4389120" rtl="0" eaLnBrk="1" latinLnBrk="0" hangingPunct="1">
+              <a:lnSpc>
+                <a:spcPct val="90000"/>
+              </a:lnSpc>
+              <a:spcBef>
+                <a:spcPts val="2400"/>
+              </a:spcBef>
+              <a:buFont typeface="Arial" panose="020B0604020202020204" pitchFamily="34" charset="0"/>
+              <a:buChar char="•"/>
+              <a:defRPr sz="8640" kern="1200">
+                <a:solidFill>
+                  <a:schemeClr val="tx1"/>
+                </a:solidFill>
+                <a:latin typeface="+mn-lt"/>
+                <a:ea typeface="+mn-ea"/>
+                <a:cs typeface="+mn-cs"/>
+              </a:defRPr>
+            </a:lvl9pPr>
+          </a:lstStyle>
+          <a:p>
+            <a:r>
+              <a:rPr lang="en-US" dirty="0">
+                <a:solidFill>
+                  <a:srgbClr val="FFFFFF"/>
+                </a:solidFill>
+                <a:latin typeface="Verdana Regular" charset="0"/>
+              </a:rPr>
+              <a:t>IN-PROGRESS</a:t>
+            </a:r>
+          </a:p>
+        </p:txBody>
+      </p:sp>
+      <p:sp>
+        <p:nvSpPr>
+          <p:cNvPr id="36" name="Text Placeholder 18">
+            <a:extLst>
+              <a:ext uri="{FF2B5EF4-FFF2-40B4-BE49-F238E27FC236}">
+                <a16:creationId xmlns:a16="http://schemas.microsoft.com/office/drawing/2014/main" id="{F6027262-FF74-49C1-891E-C17F57E475AA}"/>
+              </a:ext>
+            </a:extLst>
+          </p:cNvPr>
+          <p:cNvSpPr txBox="1">
+            <a:spLocks/>
+          </p:cNvSpPr>
+          <p:nvPr/>
+        </p:nvSpPr>
+        <p:spPr>
+          <a:xfrm>
+            <a:off x="33934401" y="26354199"/>
+            <a:ext cx="8126412" cy="8506239"/>
+          </a:xfrm>
+          <a:prstGeom prst="rect">
+            <a:avLst/>
+          </a:prstGeom>
+        </p:spPr>
+        <p:txBody>
+          <a:bodyPr wrap="square" lIns="0" tIns="0" rIns="0" bIns="0">
+            <a:spAutoFit/>
+          </a:bodyPr>
+          <a:lstStyle>
+            <a:lvl1pPr marL="457200" marR="0" indent="-457200" algn="l" defTabSz="4389120" rtl="0" eaLnBrk="1" fontAlgn="auto" latinLnBrk="0" hangingPunct="1">
+              <a:lnSpc>
+                <a:spcPts val="3360"/>
+              </a:lnSpc>
+              <a:spcBef>
+                <a:spcPts val="0"/>
+              </a:spcBef>
+              <a:spcAft>
+                <a:spcPts val="800"/>
+              </a:spcAft>
+              <a:buClrTx/>
+              <a:buSzTx/>
+              <a:buFont typeface="Arial" charset="0"/>
+              <a:buChar char="•"/>
+              <a:tabLst/>
+              <a:defRPr lang="en-US" sz="2800" kern="1200" baseline="0" smtClean="0">
+                <a:solidFill>
+                  <a:schemeClr val="tx1"/>
+                </a:solidFill>
+                <a:effectLst/>
+                <a:latin typeface="KievitPro-Regular" charset="0"/>
+                <a:ea typeface="+mn-ea"/>
+                <a:cs typeface="+mn-cs"/>
+              </a:defRPr>
+            </a:lvl1pPr>
+            <a:lvl2pPr marL="2194560" indent="0" algn="l" defTabSz="4389120" rtl="0" eaLnBrk="1" latinLnBrk="0" hangingPunct="1">
+              <a:lnSpc>
+                <a:spcPct val="90000"/>
+              </a:lnSpc>
+              <a:spcBef>
+                <a:spcPts val="2400"/>
+              </a:spcBef>
+              <a:buFontTx/>
+              <a:buNone/>
+              <a:defRPr sz="2800" kern="1200">
+                <a:solidFill>
+                  <a:schemeClr val="tx1"/>
+                </a:solidFill>
+                <a:latin typeface="+mn-lt"/>
+                <a:ea typeface="+mn-ea"/>
+                <a:cs typeface="+mn-cs"/>
+              </a:defRPr>
+            </a:lvl2pPr>
+            <a:lvl3pPr marL="4389120" indent="0" algn="l" defTabSz="4389120" rtl="0" eaLnBrk="1" latinLnBrk="0" hangingPunct="1">
+              <a:lnSpc>
+                <a:spcPct val="90000"/>
+              </a:lnSpc>
+              <a:spcBef>
+                <a:spcPts val="2400"/>
+              </a:spcBef>
+              <a:buFontTx/>
+              <a:buNone/>
+              <a:defRPr sz="9600" kern="1200">
+                <a:solidFill>
+                  <a:schemeClr val="tx1"/>
+                </a:solidFill>
+                <a:latin typeface="+mn-lt"/>
+                <a:ea typeface="+mn-ea"/>
+                <a:cs typeface="+mn-cs"/>
+              </a:defRPr>
+            </a:lvl3pPr>
+            <a:lvl4pPr marL="6583680" indent="0" algn="l" defTabSz="4389120" rtl="0" eaLnBrk="1" latinLnBrk="0" hangingPunct="1">
+              <a:lnSpc>
+                <a:spcPct val="90000"/>
+              </a:lnSpc>
+              <a:spcBef>
+                <a:spcPts val="2400"/>
+              </a:spcBef>
+              <a:buFontTx/>
+              <a:buNone/>
+              <a:defRPr sz="8640" kern="1200">
+                <a:solidFill>
+                  <a:schemeClr val="tx1"/>
+                </a:solidFill>
+                <a:latin typeface="+mn-lt"/>
+                <a:ea typeface="+mn-ea"/>
+                <a:cs typeface="+mn-cs"/>
+              </a:defRPr>
+            </a:lvl4pPr>
+            <a:lvl5pPr marL="8778240" indent="0" algn="l" defTabSz="4389120" rtl="0" eaLnBrk="1" latinLnBrk="0" hangingPunct="1">
+              <a:lnSpc>
+                <a:spcPct val="90000"/>
+              </a:lnSpc>
+              <a:spcBef>
+                <a:spcPts val="2400"/>
+              </a:spcBef>
+              <a:buFontTx/>
+              <a:buNone/>
+              <a:defRPr sz="8640" kern="1200">
+                <a:solidFill>
+                  <a:schemeClr val="tx1"/>
+                </a:solidFill>
+                <a:latin typeface="+mn-lt"/>
+                <a:ea typeface="+mn-ea"/>
+                <a:cs typeface="+mn-cs"/>
+              </a:defRPr>
+            </a:lvl5pPr>
+            <a:lvl6pPr marL="12070080" indent="-1097280" algn="l" defTabSz="4389120" rtl="0" eaLnBrk="1" latinLnBrk="0" hangingPunct="1">
+              <a:lnSpc>
+                <a:spcPct val="90000"/>
+              </a:lnSpc>
+              <a:spcBef>
+                <a:spcPts val="2400"/>
+              </a:spcBef>
+              <a:buFont typeface="Arial" panose="020B0604020202020204" pitchFamily="34" charset="0"/>
+              <a:buChar char="•"/>
+              <a:defRPr sz="8640" kern="1200">
+                <a:solidFill>
+                  <a:schemeClr val="tx1"/>
+                </a:solidFill>
+                <a:latin typeface="+mn-lt"/>
+                <a:ea typeface="+mn-ea"/>
+                <a:cs typeface="+mn-cs"/>
+              </a:defRPr>
+            </a:lvl6pPr>
+            <a:lvl7pPr marL="14264640" indent="-1097280" algn="l" defTabSz="4389120" rtl="0" eaLnBrk="1" latinLnBrk="0" hangingPunct="1">
+              <a:lnSpc>
+                <a:spcPct val="90000"/>
+              </a:lnSpc>
+              <a:spcBef>
+                <a:spcPts val="2400"/>
+              </a:spcBef>
+              <a:buFont typeface="Arial" panose="020B0604020202020204" pitchFamily="34" charset="0"/>
+              <a:buChar char="•"/>
+              <a:defRPr sz="8640" kern="1200">
+                <a:solidFill>
+                  <a:schemeClr val="tx1"/>
+                </a:solidFill>
+                <a:latin typeface="+mn-lt"/>
+                <a:ea typeface="+mn-ea"/>
+                <a:cs typeface="+mn-cs"/>
+              </a:defRPr>
+            </a:lvl7pPr>
+            <a:lvl8pPr marL="16459200" indent="-1097280" algn="l" defTabSz="4389120" rtl="0" eaLnBrk="1" latinLnBrk="0" hangingPunct="1">
+              <a:lnSpc>
+                <a:spcPct val="90000"/>
+              </a:lnSpc>
+              <a:spcBef>
+                <a:spcPts val="2400"/>
+              </a:spcBef>
+              <a:buFont typeface="Arial" panose="020B0604020202020204" pitchFamily="34" charset="0"/>
+              <a:buChar char="•"/>
+              <a:defRPr sz="8640" kern="1200">
+                <a:solidFill>
+                  <a:schemeClr val="tx1"/>
+                </a:solidFill>
+                <a:latin typeface="+mn-lt"/>
+                <a:ea typeface="+mn-ea"/>
+                <a:cs typeface="+mn-cs"/>
+              </a:defRPr>
+            </a:lvl8pPr>
+            <a:lvl9pPr marL="18653760" indent="-1097280" algn="l" defTabSz="4389120" rtl="0" eaLnBrk="1" latinLnBrk="0" hangingPunct="1">
+              <a:lnSpc>
+                <a:spcPct val="90000"/>
+              </a:lnSpc>
+              <a:spcBef>
+                <a:spcPts val="2400"/>
+              </a:spcBef>
+              <a:buFont typeface="Arial" panose="020B0604020202020204" pitchFamily="34" charset="0"/>
+              <a:buChar char="•"/>
+              <a:defRPr sz="8640" kern="1200">
+                <a:solidFill>
+                  <a:schemeClr val="tx1"/>
+                </a:solidFill>
+                <a:latin typeface="+mn-lt"/>
+                <a:ea typeface="+mn-ea"/>
+                <a:cs typeface="+mn-cs"/>
+              </a:defRPr>
+            </a:lvl9pPr>
+          </a:lstStyle>
+          <a:p>
+            <a:pPr marL="0" indent="0">
+              <a:spcAft>
+                <a:spcPts val="2600"/>
+              </a:spcAft>
+              <a:buNone/>
+            </a:pPr>
+            <a:r>
+              <a:rPr lang="en-US" dirty="0">
+                <a:latin typeface="Verdana Regular" charset="0"/>
+              </a:rPr>
+              <a:t>Design and Implementation by:</a:t>
+            </a:r>
+            <a:br>
+              <a:rPr lang="en-US" dirty="0">
+                <a:latin typeface="Verdana Regular" charset="0"/>
+              </a:rPr>
+            </a:br>
+            <a:r>
+              <a:rPr lang="en-US" dirty="0">
+                <a:latin typeface="Verdana Regular" charset="0"/>
+              </a:rPr>
+              <a:t>Jason Anderson</a:t>
+            </a:r>
+            <a:br>
+              <a:rPr lang="en-US" dirty="0">
+                <a:latin typeface="Verdana Regular" charset="0"/>
+              </a:rPr>
+            </a:br>
+            <a:r>
+              <a:rPr lang="en-US" dirty="0">
+                <a:latin typeface="Verdana Regular" charset="0"/>
+              </a:rPr>
+              <a:t>Sean Cortes</a:t>
+            </a:r>
+            <a:br>
+              <a:rPr lang="en-US" dirty="0">
+                <a:latin typeface="Verdana Regular" charset="0"/>
+              </a:rPr>
+            </a:br>
+            <a:r>
+              <a:rPr lang="en-US" dirty="0">
+                <a:latin typeface="Verdana Regular" charset="0"/>
+              </a:rPr>
+              <a:t>Joel Hoffman</a:t>
+            </a:r>
+            <a:br>
+              <a:rPr lang="en-US" dirty="0">
+                <a:latin typeface="Verdana Regular" charset="0"/>
+              </a:rPr>
+            </a:br>
+            <a:r>
+              <a:rPr lang="en-US" dirty="0" err="1">
+                <a:latin typeface="Verdana Regular" charset="0"/>
+              </a:rPr>
+              <a:t>Tingting</a:t>
+            </a:r>
+            <a:r>
+              <a:rPr lang="en-US" dirty="0">
+                <a:latin typeface="Verdana Regular" charset="0"/>
+              </a:rPr>
+              <a:t> Lin</a:t>
+            </a:r>
+            <a:br>
+              <a:rPr lang="en-US" dirty="0">
+                <a:latin typeface="Verdana Regular" charset="0"/>
+              </a:rPr>
+            </a:br>
+            <a:r>
+              <a:rPr lang="en-US" dirty="0">
+                <a:latin typeface="Verdana Regular" charset="0"/>
+              </a:rPr>
+              <a:t>Ting </a:t>
+            </a:r>
+            <a:r>
+              <a:rPr lang="en-US" dirty="0" err="1">
+                <a:latin typeface="Verdana Regular" charset="0"/>
+              </a:rPr>
+              <a:t>Sheppy</a:t>
+            </a:r>
+            <a:br>
+              <a:rPr lang="en-US" dirty="0">
+                <a:latin typeface="Verdana Regular" charset="0"/>
+              </a:rPr>
+            </a:br>
+            <a:br>
+              <a:rPr lang="en-US" dirty="0">
+                <a:latin typeface="Verdana Regular" charset="0"/>
+              </a:rPr>
+            </a:br>
+            <a:r>
+              <a:rPr lang="en-US" dirty="0">
+                <a:latin typeface="Verdana Regular" charset="0"/>
+              </a:rPr>
+              <a:t>Customer:</a:t>
+            </a:r>
+            <a:br>
+              <a:rPr lang="en-US" dirty="0">
+                <a:latin typeface="Verdana Regular" charset="0"/>
+              </a:rPr>
+            </a:br>
+            <a:r>
+              <a:rPr lang="en-US" dirty="0">
+                <a:latin typeface="Verdana Regular" charset="0"/>
+              </a:rPr>
+              <a:t>Jacob Carter</a:t>
+            </a:r>
+          </a:p>
+          <a:p>
+            <a:pPr marL="0" indent="0">
+              <a:spcAft>
+                <a:spcPts val="2600"/>
+              </a:spcAft>
+              <a:buNone/>
+            </a:pPr>
+            <a:endParaRPr lang="en-US" dirty="0">
+              <a:latin typeface="Verdana Regular" charset="0"/>
+            </a:endParaRPr>
+          </a:p>
+          <a:p>
+            <a:pPr>
+              <a:spcAft>
+                <a:spcPts val="2600"/>
+              </a:spcAft>
+            </a:pPr>
+            <a:endParaRPr lang="en-US" dirty="0">
+              <a:latin typeface="Verdana Regular" charset="0"/>
+            </a:endParaRPr>
+          </a:p>
+          <a:p>
+            <a:pPr>
+              <a:spcAft>
+                <a:spcPts val="2600"/>
+              </a:spcAft>
+            </a:pPr>
+            <a:endParaRPr lang="en-US" dirty="0">
+              <a:latin typeface="Verdana Regular" charset="0"/>
+            </a:endParaRPr>
+          </a:p>
+          <a:p>
+            <a:pPr>
+              <a:spcAft>
+                <a:spcPts val="2600"/>
+              </a:spcAft>
+            </a:pPr>
+            <a:endParaRPr lang="en-US" dirty="0">
+              <a:latin typeface="Verdana Regular" charset="0"/>
+            </a:endParaRPr>
+          </a:p>
+          <a:p>
+            <a:pPr>
+              <a:spcAft>
+                <a:spcPts val="2600"/>
+              </a:spcAft>
+            </a:pPr>
+            <a:endParaRPr lang="en-US" dirty="0">
+              <a:latin typeface="Verdana Regular" charset="0"/>
+            </a:endParaRPr>
+          </a:p>
+          <a:p>
+            <a:pPr>
+              <a:spcAft>
+                <a:spcPts val="2600"/>
+              </a:spcAft>
+            </a:pPr>
+            <a:endParaRPr lang="en-US" dirty="0">
+              <a:latin typeface="Verdana Regular" charset="0"/>
+            </a:endParaRPr>
+          </a:p>
+        </p:txBody>
+      </p:sp>
     </p:spTree>
     <p:extLst>
       <p:ext uri="{BB962C8B-B14F-4D97-AF65-F5344CB8AC3E}">

</xml_diff>

<commit_message>
adjust bottom mid-fold sections
</commit_message>
<xml_diff>
--- a/EducationForAll.pptx
+++ b/EducationForAll.pptx
@@ -1828,7 +1828,7 @@
         </p:nvSpPr>
         <p:spPr>
           <a:xfrm>
-            <a:off x="12049167" y="21914142"/>
+            <a:off x="12049167" y="22410877"/>
             <a:ext cx="9418320" cy="677108"/>
           </a:xfrm>
           <a:prstGeom prst="rect">
@@ -2026,8 +2026,8 @@
         </p:nvSpPr>
         <p:spPr>
           <a:xfrm>
-            <a:off x="12049167" y="22873260"/>
-            <a:ext cx="9418320" cy="5360442"/>
+            <a:off x="12049167" y="23369995"/>
+            <a:ext cx="9418320" cy="7839390"/>
           </a:xfrm>
           <a:prstGeom prst="rect">
             <a:avLst/>
@@ -2232,7 +2232,7 @@
               <a:rPr lang="en-US" dirty="0">
                 <a:latin typeface="Verdana Regular" charset="0"/>
               </a:rPr>
-              <a:t>We chose the client-server architecture for our program. We mapped out the entity relationship diagram for database. As part of the process, we also did the interface requirements as well as data flow.</a:t>
+              <a:t>Our team identified a web application as the best platform for the stated goals. </a:t>
             </a:r>
           </a:p>
           <a:p>
@@ -2247,7 +2247,7 @@
               <a:rPr lang="en-US" dirty="0">
                 <a:latin typeface="Verdana Regular" charset="0"/>
               </a:rPr>
-              <a:t>We then came up with user stories to break down the program into smaller portions to implement. </a:t>
+              <a:t>The design/planning phase was performed under the water model.</a:t>
             </a:r>
           </a:p>
           <a:p>
@@ -2262,7 +2262,22 @@
               <a:rPr lang="en-US" dirty="0">
                 <a:latin typeface="Verdana Regular" charset="0"/>
               </a:rPr>
-              <a:t>This application was developed by agile processes. </a:t>
+              <a:t>We chose a three-tier architecture for our program (presentation tier: front-end, logic tier: back-end, data tier: database).</a:t>
+            </a:r>
+          </a:p>
+          <a:p>
+            <a:pPr marL="457200" indent="-457200">
+              <a:spcAft>
+                <a:spcPts val="2600"/>
+              </a:spcAft>
+              <a:buFont typeface="Arial" panose="020B0604020202020204" pitchFamily="34" charset="0"/>
+              <a:buChar char="•"/>
+            </a:pPr>
+            <a:r>
+              <a:rPr lang="en-US" dirty="0">
+                <a:latin typeface="Verdana Regular" charset="0"/>
+              </a:rPr>
+              <a:t>Mapped out an entity relationship diagram for our database. Created dataflow diagrams for the high-level architecture and message sequence charts for critical use cases.</a:t>
             </a:r>
           </a:p>
         </p:txBody>
@@ -2277,7 +2292,7 @@
         </p:nvSpPr>
         <p:spPr>
           <a:xfrm>
-            <a:off x="22207325" y="21914142"/>
+            <a:off x="22207325" y="22410877"/>
             <a:ext cx="10112147" cy="664797"/>
           </a:xfrm>
           <a:prstGeom prst="rect">
@@ -2475,8 +2490,8 @@
         </p:nvSpPr>
         <p:spPr>
           <a:xfrm>
-            <a:off x="22207325" y="22873260"/>
-            <a:ext cx="9418320" cy="5257850"/>
+            <a:off x="22207324" y="23369995"/>
+            <a:ext cx="9883761" cy="8711424"/>
           </a:xfrm>
           <a:prstGeom prst="rect">
             <a:avLst/>
@@ -2664,7 +2679,7 @@
               <a:rPr lang="en-US" dirty="0">
                 <a:latin typeface="Verdana Regular" charset="0"/>
               </a:rPr>
-              <a:t>We prioritized our top user stories to implement while maintain communication with our customer and team members. </a:t>
+              <a:t>Due to each function building off the other, we approached development in an incremental fashion. We began by estimating effort values for each user story and then chose from the bottom-up which ones to implement in the given two week window.</a:t>
             </a:r>
           </a:p>
           <a:p>
@@ -2677,7 +2692,7 @@
               <a:rPr lang="en-US" dirty="0">
                 <a:latin typeface="Verdana Regular" charset="0"/>
               </a:rPr>
-              <a:t>After implementation, we did unit testing, integration testing and acceptance testing to meet quality targets.</a:t>
+              <a:t>Before each function’s implementation, we wrote simple unit tests. After implementation, we performed, integration testing and acceptance testing to meet quality targets.</a:t>
             </a:r>
           </a:p>
           <a:p>
@@ -2687,10 +2702,16 @@
               </a:spcAft>
             </a:pPr>
             <a:r>
+              <a:rPr lang="en-US" dirty="0" err="1">
+                <a:latin typeface="Verdana Regular" charset="0"/>
+              </a:rPr>
+              <a:t>Agile’s</a:t>
+            </a:r>
+            <a:r>
               <a:rPr lang="en-US" dirty="0">
                 <a:latin typeface="Verdana Regular" charset="0"/>
               </a:rPr>
-              <a:t>Rapid feedback cycle allows us to identify problems/issues and resolve them quickly.</a:t>
+              <a:t> rapid feedback cycle allows us to identify problems/issues and resolve them quickly. Our customer, Jacob, was included in discussions at all stages of the development cycle.</a:t>
             </a:r>
           </a:p>
           <a:p>
@@ -2703,7 +2724,7 @@
               <a:rPr lang="en-US" dirty="0">
                 <a:latin typeface="Verdana Regular" charset="0"/>
               </a:rPr>
-              <a:t>??? Anything else?  </a:t>
+              <a:t>Weekly meetings enabled us to analyze code for any possible faults, or areas that would benefit from refactoring.</a:t>
             </a:r>
           </a:p>
           <a:p>
@@ -4094,7 +4115,7 @@
         </p:nvSpPr>
         <p:spPr>
           <a:xfrm>
-            <a:off x="27446041" y="7216405"/>
+            <a:off x="27503191" y="7216405"/>
             <a:ext cx="5202969" cy="6370975"/>
           </a:xfrm>
           <a:prstGeom prst="rect">
@@ -4166,8 +4187,8 @@
         </p:nvSpPr>
         <p:spPr>
           <a:xfrm>
-            <a:off x="16573500" y="14493950"/>
-            <a:ext cx="16075511" cy="7125871"/>
+            <a:off x="16487776" y="14681784"/>
+            <a:ext cx="16075510" cy="7125871"/>
           </a:xfrm>
           <a:prstGeom prst="rect">
             <a:avLst/>
@@ -4226,7 +4247,7 @@
         </p:blipFill>
         <p:spPr>
           <a:xfrm>
-            <a:off x="16758327" y="14697168"/>
+            <a:off x="16672602" y="14885002"/>
             <a:ext cx="9587398" cy="6770979"/>
           </a:xfrm>
           <a:prstGeom prst="rect">
@@ -4256,7 +4277,7 @@
         </p:blipFill>
         <p:spPr>
           <a:xfrm>
-            <a:off x="26472913" y="14670242"/>
+            <a:off x="26444338" y="14858076"/>
             <a:ext cx="6001224" cy="6797905"/>
           </a:xfrm>
           <a:prstGeom prst="rect">
@@ -4278,7 +4299,7 @@
         </p:nvSpPr>
         <p:spPr>
           <a:xfrm>
-            <a:off x="11242918" y="14493950"/>
+            <a:off x="11242918" y="14681784"/>
             <a:ext cx="5330583" cy="7232749"/>
           </a:xfrm>
           <a:prstGeom prst="rect">
@@ -4422,7 +4443,7 @@
         </p:blipFill>
         <p:spPr>
           <a:xfrm>
-            <a:off x="11418403" y="7361403"/>
+            <a:off x="11418403" y="7353783"/>
             <a:ext cx="9841397" cy="6889494"/>
           </a:xfrm>
           <a:prstGeom prst="rect">
@@ -4452,7 +4473,7 @@
         </p:blipFill>
         <p:spPr>
           <a:xfrm>
-            <a:off x="21386988" y="7347284"/>
+            <a:off x="21372474" y="7347284"/>
             <a:ext cx="5889823" cy="6889495"/>
           </a:xfrm>
           <a:prstGeom prst="rect">

</xml_diff>